<commit_message>
Adding the powerpoint slides and add archtecture rationlie portions
</commit_message>
<xml_diff>
--- a/Software Requirement Engineering and product management.pptx
+++ b/Software Requirement Engineering and product management.pptx
@@ -3527,7 +3527,12 @@
             <p:ph type="ctrTitle"/>
           </p:nvPr>
         </p:nvSpPr>
-        <p:spPr/>
+        <p:spPr>
+          <a:xfrm>
+            <a:off x="762000" y="228600"/>
+            <a:ext cx="7772400" cy="1470025"/>
+          </a:xfrm>
+        </p:spPr>
         <p:txBody>
           <a:bodyPr>
             <a:normAutofit fontScale="90000"/>
@@ -3560,19 +3565,77 @@
             <p:ph type="subTitle" idx="1"/>
           </p:nvPr>
         </p:nvSpPr>
-        <p:spPr/>
-        <p:txBody>
-          <a:bodyPr/>
+        <p:spPr>
+          <a:xfrm>
+            <a:off x="1447800" y="1698625"/>
+            <a:ext cx="6400800" cy="533400"/>
+          </a:xfrm>
+        </p:spPr>
+        <p:txBody>
+          <a:bodyPr>
+            <a:noAutofit/>
+          </a:bodyPr>
           <a:lstStyle/>
           <a:p>
             <a:r>
               <a:rPr lang="en-US" dirty="0" smtClean="0"/>
-              <a:t>Boat Dock App</a:t>
+              <a:t>Boat Dock </a:t>
+            </a:r>
+            <a:r>
+              <a:rPr lang="en-US" dirty="0" smtClean="0"/>
+              <a:t>App</a:t>
+            </a:r>
+          </a:p>
+          <a:p>
+            <a:r>
+              <a:rPr lang="en-US" dirty="0" smtClean="0"/>
+              <a:t>Group 4</a:t>
             </a:r>
             <a:endParaRPr lang="en-US" dirty="0"/>
           </a:p>
         </p:txBody>
       </p:sp>
+      <p:pic>
+        <p:nvPicPr>
+          <p:cNvPr id="1026" name="Picture 2" descr="Indonesia, Bali, Aerial view of mooring area and boats — water, vessel -  Stock Photo | #270461206"/>
+          <p:cNvPicPr>
+            <a:picLocks noChangeAspect="1" noChangeArrowheads="1"/>
+          </p:cNvPicPr>
+          <p:nvPr/>
+        </p:nvPicPr>
+        <p:blipFill>
+          <a:blip r:embed="rId2" cstate="print">
+            <a:extLst>
+              <a:ext uri="{28A0092B-C50C-407E-A947-70E740481C1C}">
+                <a14:useLocalDpi xmlns:a14="http://schemas.microsoft.com/office/drawing/2010/main" val="0"/>
+              </a:ext>
+            </a:extLst>
+          </a:blip>
+          <a:srcRect/>
+          <a:stretch>
+            <a:fillRect/>
+          </a:stretch>
+        </p:blipFill>
+        <p:spPr bwMode="auto">
+          <a:xfrm>
+            <a:off x="1676400" y="2819400"/>
+            <a:ext cx="6477000" cy="3733800"/>
+          </a:xfrm>
+          <a:prstGeom prst="rect">
+            <a:avLst/>
+          </a:prstGeom>
+          <a:noFill/>
+          <a:extLst>
+            <a:ext uri="{909E8E84-426E-40DD-AFC4-6F175D3DCCD1}">
+              <a14:hiddenFill xmlns:a14="http://schemas.microsoft.com/office/drawing/2010/main">
+                <a:solidFill>
+                  <a:srgbClr val="FFFFFF"/>
+                </a:solidFill>
+              </a14:hiddenFill>
+            </a:ext>
+          </a:extLst>
+        </p:spPr>
+      </p:pic>
     </p:spTree>
   </p:cSld>
   <p:clrMapOvr>
@@ -3906,7 +3969,6 @@
               <a:rPr lang="en-US" dirty="0" smtClean="0"/>
               <a:t>Discussion about prioritization and release planning  </a:t>
             </a:r>
-            <a:endParaRPr lang="en-US" dirty="0" smtClean="0"/>
           </a:p>
         </p:txBody>
       </p:sp>
@@ -7163,11 +7225,7 @@
             </a:pPr>
             <a:r>
               <a:rPr lang="en-US" dirty="0" smtClean="0"/>
-              <a:t>Travelers/boat owner </a:t>
-            </a:r>
-            <a:r>
-              <a:rPr lang="en-US" dirty="0" smtClean="0"/>
-              <a:t> </a:t>
+              <a:t>Travelers/boat owner  </a:t>
             </a:r>
           </a:p>
           <a:p>
@@ -8894,11 +8952,7 @@
           <a:p>
             <a:r>
               <a:rPr lang="en-US" dirty="0" smtClean="0"/>
-              <a:t>Elicitation and </a:t>
-            </a:r>
-            <a:r>
-              <a:rPr lang="en-US" dirty="0" smtClean="0"/>
-              <a:t>technique</a:t>
+              <a:t>Elicitation and technique</a:t>
             </a:r>
           </a:p>
           <a:p>
@@ -8906,7 +8960,6 @@
               <a:rPr lang="en-US" dirty="0" smtClean="0"/>
               <a:t>Requirement Specification technique</a:t>
             </a:r>
-            <a:endParaRPr lang="en-US" dirty="0" smtClean="0"/>
           </a:p>
           <a:p>
             <a:r>
@@ -8919,7 +8972,6 @@
               <a:rPr lang="en-US" dirty="0" smtClean="0"/>
               <a:t>Release Planning</a:t>
             </a:r>
-            <a:endParaRPr lang="en-US" dirty="0" smtClean="0"/>
           </a:p>
           <a:p>
             <a:r>
@@ -8932,7 +8984,6 @@
               <a:rPr lang="en-US" dirty="0" smtClean="0"/>
               <a:t>Q &amp; A</a:t>
             </a:r>
-            <a:endParaRPr lang="en-US" dirty="0" smtClean="0"/>
           </a:p>
           <a:p>
             <a:endParaRPr lang="en-US" dirty="0"/>
@@ -9123,23 +9174,7 @@
           <a:p>
             <a:r>
               <a:rPr lang="en-US" dirty="0" smtClean="0"/>
-              <a:t>The user need to publish Add, search advertisement, browsing the moor </a:t>
-            </a:r>
-            <a:r>
-              <a:rPr lang="en-US" dirty="0" smtClean="0"/>
-              <a:t>catalogue </a:t>
-            </a:r>
-            <a:r>
-              <a:rPr lang="en-US" dirty="0" smtClean="0"/>
-              <a:t>and ability to complete mooring hiring </a:t>
-            </a:r>
-            <a:r>
-              <a:rPr lang="en-US" dirty="0" smtClean="0"/>
-              <a:t>online </a:t>
-            </a:r>
-            <a:r>
-              <a:rPr lang="en-US" dirty="0" smtClean="0"/>
-              <a:t>with payment system. </a:t>
+              <a:t>The user need to publish Add, search advertisement, browsing the moor catalogue and ability to complete mooring hiring online with payment system. </a:t>
             </a:r>
           </a:p>
           <a:p>

</xml_diff>